<commit_message>
added a wrapper command to run
</commit_message>
<xml_diff>
--- a/outputs/EQORE_Deck.pptx
+++ b/outputs/EQORE_Deck.pptx
@@ -7,11 +7,6 @@
   <p:sldIdLst>
     <p:sldId id="256" r:id="rId7"/>
     <p:sldId id="257" r:id="rId8"/>
-    <p:sldId id="258" r:id="rId9"/>
-    <p:sldId id="259" r:id="rId10"/>
-    <p:sldId id="260" r:id="rId11"/>
-    <p:sldId id="261" r:id="rId12"/>
-    <p:sldId id="262" r:id="rId13"/>
   </p:sldIdLst>
   <p:sldSz cx="9144000" cy="6858000" type="screen4x3"/>
   <p:notesSz cx="6858000" cy="9144000"/>
@@ -3110,7 +3105,7 @@
           <a:lstStyle/>
           <a:p>
             <a:r>
-              <a:t>EQORE Non‑Dilutive Funding Opportunities</a:t>
+              <a:t>EQORE Funding Deck</a:t>
             </a:r>
           </a:p>
         </p:txBody>
@@ -3131,7 +3126,7 @@
           <a:lstStyle/>
           <a:p>
             <a:r>
-              <a:t>Top 20 Grants and Programs • Updated Sept 2025</a:t>
+              <a:t>Auto-generated deck</a:t>
             </a:r>
           </a:p>
         </p:txBody>
@@ -3170,7 +3165,7 @@
           <a:lstStyle/>
           <a:p>
             <a:r>
-              <a:t>Methodology</a:t>
+              <a:t>Top Opportunities</a:t>
             </a:r>
           </a:p>
         </p:txBody>
@@ -3189,452 +3184,7 @@
         <p:txBody>
           <a:bodyPr/>
           <a:lstStyle/>
-          <a:p>
-            <a:r>
-              <a:t>• Fatal-flaw filters (eligibility, deadlines, TRL, match)</a:t>
-            </a:r>
-          </a:p>
-          <a:p>
-            <a:r>
-              <a:t>• Scoring: Relevance × EQORE Fit × (Ease ÷ 5)</a:t>
-            </a:r>
-          </a:p>
-          <a:p>
-            <a:r>
-              <a:t>• 20 Clean opportunities (scored), plus Dirty/Out-of-Scope</a:t>
-            </a:r>
-          </a:p>
-          <a:p>
-            <a:r>
-              <a:t>• Prioritize Top 10, highlight actionable Top 5</a:t>
-            </a:r>
-          </a:p>
-          <a:p>
-            <a:r>
-              <a:t>• Links direct to FOA/solicitation pages</a:t>
-            </a:r>
-          </a:p>
-        </p:txBody>
-      </p:sp>
-    </p:spTree>
-  </p:cSld>
-  <p:clrMapOvr>
-    <a:masterClrMapping/>
-  </p:clrMapOvr>
-</p:sld>
-</file>
-
-<file path=ppt/slides/slide3.xml><?xml version="1.0" encoding="utf-8"?>
-<p:sld xmlns:a="http://schemas.openxmlformats.org/drawingml/2006/main" xmlns:p="http://schemas.openxmlformats.org/presentationml/2006/main" xmlns:r="http://schemas.openxmlformats.org/officeDocument/2006/relationships">
-  <p:cSld>
-    <p:spTree>
-      <p:nvGrpSpPr>
-        <p:cNvPr id="1" name=""/>
-        <p:cNvGrpSpPr/>
-        <p:nvPr/>
-      </p:nvGrpSpPr>
-      <p:grpSpPr/>
-      <p:sp>
-        <p:nvSpPr>
-          <p:cNvPr id="2" name="Title 1"/>
-          <p:cNvSpPr>
-            <a:spLocks noGrp="1"/>
-          </p:cNvSpPr>
-          <p:nvPr>
-            <p:ph type="title"/>
-          </p:nvPr>
-        </p:nvSpPr>
-        <p:spPr/>
-        <p:txBody>
-          <a:bodyPr/>
-          <a:lstStyle/>
-          <a:p>
-            <a:r>
-              <a:t>50+ scanned → 20 Clean (scored) → 10 Shortlist → 5 Top Targets</a:t>
-            </a:r>
-          </a:p>
-        </p:txBody>
-      </p:sp>
-    </p:spTree>
-  </p:cSld>
-  <p:clrMapOvr>
-    <a:masterClrMapping/>
-  </p:clrMapOvr>
-</p:sld>
-</file>
-
-<file path=ppt/slides/slide4.xml><?xml version="1.0" encoding="utf-8"?>
-<p:sld xmlns:a="http://schemas.openxmlformats.org/drawingml/2006/main" xmlns:p="http://schemas.openxmlformats.org/presentationml/2006/main" xmlns:r="http://schemas.openxmlformats.org/officeDocument/2006/relationships">
-  <p:cSld>
-    <p:spTree>
-      <p:nvGrpSpPr>
-        <p:cNvPr id="1" name=""/>
-        <p:cNvGrpSpPr/>
-        <p:nvPr/>
-      </p:nvGrpSpPr>
-      <p:grpSpPr/>
-      <p:sp>
-        <p:nvSpPr>
-          <p:cNvPr id="2" name="Title 1"/>
-          <p:cNvSpPr>
-            <a:spLocks noGrp="1"/>
-          </p:cNvSpPr>
-          <p:nvPr>
-            <p:ph type="title"/>
-          </p:nvPr>
-        </p:nvSpPr>
-        <p:spPr/>
-        <p:txBody>
-          <a:bodyPr/>
-          <a:lstStyle/>
-          <a:p>
-            <a:r>
-              <a:t>1. NSF SBIR/STTR Phase I (NSF 24-579) (12.0)</a:t>
-            </a:r>
-          </a:p>
-          <a:p>
-            <a:r>
-              <a:t>2. CHOIR (Coordinated Holistic Orchestration of IBRs) (15.0)</a:t>
-            </a:r>
-          </a:p>
-          <a:p>
-            <a:r>
-              <a:t>3. GFO-24-312 Advanced Grid Technology Acceleration (8.0)</a:t>
-            </a:r>
-          </a:p>
-          <a:p>
-            <a:r>
-              <a:t>4. Improving Net-Load Forecasting w/ BtM Data (7.2)</a:t>
-            </a:r>
-          </a:p>
-          <a:p>
-            <a:r>
-              <a:t>5. NSF Translation to Practice (TTP, 25-540) (7.2)</a:t>
-            </a:r>
-          </a:p>
-          <a:p>
-            <a:r>
-              <a:t>6. MassCEC AmplifyMass (Rolling) (9.6)</a:t>
-            </a:r>
-          </a:p>
-          <a:p>
-            <a:r>
-              <a:t>7. NSF S&amp;CC Development Grants (25-527) (5.4)</a:t>
-            </a:r>
-          </a:p>
-          <a:p>
-            <a:r>
-              <a:t>8. NSF S&amp;CC IRG (25-527) (3.6)</a:t>
-            </a:r>
-          </a:p>
-          <a:p>
-            <a:r>
-              <a:t>9. NSF S&amp;CC LSR (25-527) (2.4)</a:t>
-            </a:r>
-          </a:p>
-          <a:p>
-            <a:r>
-              <a:t>10. NSF Future CoRe: CPS (25-543) (5.4)</a:t>
-            </a:r>
-          </a:p>
-          <a:p>
-            <a:r>
-              <a:t>11. ARPA‑E SPARKS (DE‑FOA‑0003164) (5.4)</a:t>
-            </a:r>
-          </a:p>
-          <a:p>
-            <a:r>
-              <a:t>12. DOE Office of Science FA Program (DE‑FOA‑0003432) (0.8)</a:t>
-            </a:r>
-          </a:p>
-          <a:p>
-            <a:r>
-              <a:t>13. EDA FY25 Disaster Supplemental (3.6)</a:t>
-            </a:r>
-          </a:p>
-          <a:p>
-            <a:r>
-              <a:t>14. LBE Decarbonization Implementation Grants (5.4)</a:t>
-            </a:r>
-          </a:p>
-          <a:p>
-            <a:r>
-              <a:t>15. NSF VINES – Track 2 (25‑539) (3.6)</a:t>
-            </a:r>
-          </a:p>
-          <a:p>
-            <a:r>
-              <a:t>16. NSF Infrastructure Systems &amp; People (PD‑25‑342Y) (5.4)</a:t>
-            </a:r>
-          </a:p>
-          <a:p>
-            <a:r>
-              <a:t>17. DOE Building Technologies Office (BTO) FOA (2025) (7.2)</a:t>
-            </a:r>
-          </a:p>
-          <a:p>
-            <a:r>
-              <a:t>18. DOE Solar Energy Technologies Office (SETO) FOA (2025) (5.4)</a:t>
-            </a:r>
-          </a:p>
-          <a:p>
-            <a:r>
-              <a:t>19. DOE Vehicle Technologies Office (VTO) FOA (2025) (2.4)</a:t>
-            </a:r>
-          </a:p>
-          <a:p>
-            <a:r>
-              <a:t>20. FEMA Hazard Mitigation Grant Program (HMGP) (2.4)</a:t>
-            </a:r>
-          </a:p>
-        </p:txBody>
-      </p:sp>
-    </p:spTree>
-  </p:cSld>
-  <p:clrMapOvr>
-    <a:masterClrMapping/>
-  </p:clrMapOvr>
-</p:sld>
-</file>
-
-<file path=ppt/slides/slide5.xml><?xml version="1.0" encoding="utf-8"?>
-<p:sld xmlns:a="http://schemas.openxmlformats.org/drawingml/2006/main" xmlns:p="http://schemas.openxmlformats.org/presentationml/2006/main" xmlns:r="http://schemas.openxmlformats.org/officeDocument/2006/relationships">
-  <p:cSld>
-    <p:spTree>
-      <p:nvGrpSpPr>
-        <p:cNvPr id="1" name=""/>
-        <p:cNvGrpSpPr/>
-        <p:nvPr/>
-      </p:nvGrpSpPr>
-      <p:grpSpPr/>
-      <p:sp>
-        <p:nvSpPr>
-          <p:cNvPr id="2" name="Title 1"/>
-          <p:cNvSpPr>
-            <a:spLocks noGrp="1"/>
-          </p:cNvSpPr>
-          <p:nvPr>
-            <p:ph type="title"/>
-          </p:nvPr>
-        </p:nvSpPr>
-        <p:spPr/>
-        <p:txBody>
-          <a:bodyPr/>
-          <a:lstStyle/>
-          <a:p>
-            <a:r>
-              <a:t>2. CHOIR (Coordinated Holistic Orchestration of IBRs) — California Energy Commission (EPIC) (Score 15.0)</a:t>
-            </a:r>
-          </a:p>
-          <a:p>
-            <a:r>
-              <a:t>1. NSF SBIR/STTR Phase I (NSF 24-579) — National Science Foundation (Score 12.0)</a:t>
-            </a:r>
-          </a:p>
-          <a:p>
-            <a:r>
-              <a:t>6. MassCEC AmplifyMass (Rolling) — Massachusetts Clean Energy Center (Score 9.6)</a:t>
-            </a:r>
-          </a:p>
-          <a:p>
-            <a:r>
-              <a:t>3. GFO-24-312 Advanced Grid Technology Acceleration — California Energy Commission (Score 8.0)</a:t>
-            </a:r>
-          </a:p>
-          <a:p>
-            <a:r>
-              <a:t>4. Improving Net-Load Forecasting w/ BtM Data — California Energy Commission (EPIC) (Score 7.2)</a:t>
-            </a:r>
-          </a:p>
-          <a:p>
-            <a:r>
-              <a:t>5. NSF Translation to Practice (TTP, 25-540) — National Science Foundation (Score 7.2)</a:t>
-            </a:r>
-          </a:p>
-          <a:p>
-            <a:r>
-              <a:t>17. DOE Building Technologies Office (BTO) FOA (2025) — U.S. DOE – EERE BTO (Score 7.2)</a:t>
-            </a:r>
-          </a:p>
-          <a:p>
-            <a:r>
-              <a:t>18. DOE Solar Energy Technologies Office (SETO) FOA (2025) — U.S. DOE – EERE SETO (Score 5.4)</a:t>
-            </a:r>
-          </a:p>
-          <a:p>
-            <a:r>
-              <a:t>16. NSF Infrastructure Systems &amp; People (PD‑25‑342Y) — National Science Foundation (Score 5.4)</a:t>
-            </a:r>
-          </a:p>
-          <a:p>
-            <a:r>
-              <a:t>14. LBE Decarbonization Implementation Grants — MA DOER – Leading by Example (Score 5.4)</a:t>
-            </a:r>
-          </a:p>
-        </p:txBody>
-      </p:sp>
-    </p:spTree>
-  </p:cSld>
-  <p:clrMapOvr>
-    <a:masterClrMapping/>
-  </p:clrMapOvr>
-</p:sld>
-</file>
-
-<file path=ppt/slides/slide6.xml><?xml version="1.0" encoding="utf-8"?>
-<p:sld xmlns:a="http://schemas.openxmlformats.org/drawingml/2006/main" xmlns:p="http://schemas.openxmlformats.org/presentationml/2006/main" xmlns:r="http://schemas.openxmlformats.org/officeDocument/2006/relationships">
-  <p:cSld>
-    <p:spTree>
-      <p:nvGrpSpPr>
-        <p:cNvPr id="1" name=""/>
-        <p:cNvGrpSpPr/>
-        <p:nvPr/>
-      </p:nvGrpSpPr>
-      <p:grpSpPr/>
-      <p:sp>
-        <p:nvSpPr>
-          <p:cNvPr id="2" name="Title 1"/>
-          <p:cNvSpPr>
-            <a:spLocks noGrp="1"/>
-          </p:cNvSpPr>
-          <p:nvPr>
-            <p:ph type="title"/>
-          </p:nvPr>
-        </p:nvSpPr>
-        <p:spPr/>
-        <p:txBody>
-          <a:bodyPr/>
-          <a:lstStyle/>
-          <a:p>
-            <a:r>
-              <a:t>2. CHOIR (Coordinated Holistic Orchestration of IBRs) — California Energy Commission (EPIC)</a:t>
-            </a:r>
-          </a:p>
-          <a:p>
-            <a:r>
-              <a:t>   Flagship CA IBR/VPP orchestration</a:t>
-            </a:r>
-          </a:p>
-          <a:p>
-            <a:r>
-              <a:t>1. NSF SBIR/STTR Phase I (NSF 24-579) — National Science Foundation</a:t>
-            </a:r>
-          </a:p>
-          <a:p>
-            <a:r>
-              <a:t>   Core federal R&amp;D for controls/BTM</a:t>
-            </a:r>
-          </a:p>
-          <a:p>
-            <a:r>
-              <a:t>6. MassCEC AmplifyMass (Rolling) — Massachusetts Clean Energy Center</a:t>
-            </a:r>
-          </a:p>
-          <a:p>
-            <a:r>
-              <a:t>   Stacks with federal/CEC awards</a:t>
-            </a:r>
-          </a:p>
-          <a:p>
-            <a:r>
-              <a:t>3. GFO-24-312 Advanced Grid Technology Acceleration — California Energy Commission</a:t>
-            </a:r>
-          </a:p>
-          <a:p>
-            <a:r>
-              <a:t>   CA grid-tech demos; tight timeline/match</a:t>
-            </a:r>
-          </a:p>
-          <a:p>
-            <a:r>
-              <a:t>4. Improving Net-Load Forecasting w/ BtM Data — California Energy Commission (EPIC)</a:t>
-            </a:r>
-          </a:p>
-          <a:p>
-            <a:r>
-              <a:t>   Direct to BtM/VPP modeling</a:t>
-            </a:r>
-          </a:p>
-        </p:txBody>
-      </p:sp>
-    </p:spTree>
-  </p:cSld>
-  <p:clrMapOvr>
-    <a:masterClrMapping/>
-  </p:clrMapOvr>
-</p:sld>
-</file>
-
-<file path=ppt/slides/slide7.xml><?xml version="1.0" encoding="utf-8"?>
-<p:sld xmlns:a="http://schemas.openxmlformats.org/drawingml/2006/main" xmlns:p="http://schemas.openxmlformats.org/presentationml/2006/main" xmlns:r="http://schemas.openxmlformats.org/officeDocument/2006/relationships">
-  <p:cSld>
-    <p:spTree>
-      <p:nvGrpSpPr>
-        <p:cNvPr id="1" name=""/>
-        <p:cNvGrpSpPr/>
-        <p:nvPr/>
-      </p:nvGrpSpPr>
-      <p:grpSpPr/>
-      <p:sp>
-        <p:nvSpPr>
-          <p:cNvPr id="2" name="Title 1"/>
-          <p:cNvSpPr>
-            <a:spLocks noGrp="1"/>
-          </p:cNvSpPr>
-          <p:nvPr>
-            <p:ph type="title"/>
-          </p:nvPr>
-        </p:nvSpPr>
-        <p:spPr/>
-        <p:txBody>
-          <a:bodyPr/>
-          <a:lstStyle/>
-          <a:p>
-            <a:r>
-              <a:t>Executive Summary</a:t>
-            </a:r>
-          </a:p>
-        </p:txBody>
-      </p:sp>
-      <p:sp>
-        <p:nvSpPr>
-          <p:cNvPr id="3" name="Content Placeholder 2"/>
-          <p:cNvSpPr>
-            <a:spLocks noGrp="1"/>
-          </p:cNvSpPr>
-          <p:nvPr>
-            <p:ph idx="1"/>
-          </p:nvPr>
-        </p:nvSpPr>
-        <p:spPr/>
-        <p:txBody>
-          <a:bodyPr/>
-          <a:lstStyle/>
-          <a:p>
-            <a:r>
-              <a:t>• Total Opportunities: 20 Clean</a:t>
-            </a:r>
-          </a:p>
-          <a:p>
-            <a:r>
-              <a:t>• Top 10 prioritized, Top 5 highlighted as actionable</a:t>
-            </a:r>
-          </a:p>
-          <a:p>
-            <a:r>
-              <a:t>• MA + CA coverage, plus federal DOE/NSF programs</a:t>
-            </a:r>
-          </a:p>
-          <a:p>
-            <a:r>
-              <a:t>• Strong alignment with TRL‑7, BTM storage, and VPP</a:t>
-            </a:r>
-          </a:p>
-          <a:p>
-            <a:r>
-              <a:t>• Next Steps: prepare applications for high‑scoring FOAs</a:t>
-            </a:r>
-          </a:p>
+          <a:p/>
         </p:txBody>
       </p:sp>
     </p:spTree>

</xml_diff>